<commit_message>
update pendulum.pptx and pendulum.png
</commit_message>
<xml_diff>
--- a/content/08_schwingungen/images/pendulum.pptx
+++ b/content/08_schwingungen/images/pendulum.pptx
@@ -117,13 +117,109 @@
 <file path=ppt/revisionInfo.xml><?xml version="1.0" encoding="utf-8"?>
 <p1510:revInfo xmlns:a="http://schemas.openxmlformats.org/drawingml/2006/main" xmlns:r="http://schemas.openxmlformats.org/officeDocument/2006/relationships" xmlns:p1510="http://schemas.microsoft.com/office/powerpoint/2015/10/main">
   <p1510:revLst>
-    <p1510:client id="{84929B0C-37A2-423C-B030-BC1A645653C0}" v="2" dt="2022-03-23T13:47:28.556"/>
+    <p1510:client id="{61DDE294-9CDB-40A1-93FF-9A39AD164796}" v="10" dt="2022-03-30T07:59:18.614"/>
   </p1510:revLst>
 </p1510:revInfo>
 </file>
 
 <file path=ppt/changesInfos/changesInfo1.xml><?xml version="1.0" encoding="utf-8"?>
 <pc:chgInfo xmlns:a="http://schemas.openxmlformats.org/drawingml/2006/main" xmlns:r="http://schemas.openxmlformats.org/officeDocument/2006/relationships" xmlns:ac="http://schemas.microsoft.com/office/drawing/2013/main/command" xmlns:pc="http://schemas.microsoft.com/office/powerpoint/2013/main/command">
+  <pc:docChgLst>
+    <pc:chgData name="philipp.spelten@365h-brs.de" userId="bf49d2dc-2959-4525-96a1-3447e597065c" providerId="ADAL" clId="{61DDE294-9CDB-40A1-93FF-9A39AD164796}"/>
+    <pc:docChg chg="custSel modSld">
+      <pc:chgData name="philipp.spelten@365h-brs.de" userId="bf49d2dc-2959-4525-96a1-3447e597065c" providerId="ADAL" clId="{61DDE294-9CDB-40A1-93FF-9A39AD164796}" dt="2022-03-30T07:59:18.613" v="77" actId="207"/>
+      <pc:docMkLst>
+        <pc:docMk/>
+      </pc:docMkLst>
+      <pc:sldChg chg="addSp modSp mod">
+        <pc:chgData name="philipp.spelten@365h-brs.de" userId="bf49d2dc-2959-4525-96a1-3447e597065c" providerId="ADAL" clId="{61DDE294-9CDB-40A1-93FF-9A39AD164796}" dt="2022-03-30T07:59:18.613" v="77" actId="207"/>
+        <pc:sldMkLst>
+          <pc:docMk/>
+          <pc:sldMk cId="3239150023" sldId="258"/>
+        </pc:sldMkLst>
+        <pc:spChg chg="mod">
+          <ac:chgData name="philipp.spelten@365h-brs.de" userId="bf49d2dc-2959-4525-96a1-3447e597065c" providerId="ADAL" clId="{61DDE294-9CDB-40A1-93FF-9A39AD164796}" dt="2022-03-30T07:59:18.613" v="77" actId="207"/>
+          <ac:spMkLst>
+            <pc:docMk/>
+            <pc:sldMk cId="3239150023" sldId="258"/>
+            <ac:spMk id="21" creationId="{B54D63E4-D0EA-4D8B-AA5E-5603B6E3E42E}"/>
+          </ac:spMkLst>
+        </pc:spChg>
+        <pc:spChg chg="mod">
+          <ac:chgData name="philipp.spelten@365h-brs.de" userId="bf49d2dc-2959-4525-96a1-3447e597065c" providerId="ADAL" clId="{61DDE294-9CDB-40A1-93FF-9A39AD164796}" dt="2022-03-30T07:56:39.454" v="75" actId="207"/>
+          <ac:spMkLst>
+            <pc:docMk/>
+            <pc:sldMk cId="3239150023" sldId="258"/>
+            <ac:spMk id="23" creationId="{95D1FCCC-8D71-4979-9473-6014B2FDDECD}"/>
+          </ac:spMkLst>
+        </pc:spChg>
+        <pc:spChg chg="mod">
+          <ac:chgData name="philipp.spelten@365h-brs.de" userId="bf49d2dc-2959-4525-96a1-3447e597065c" providerId="ADAL" clId="{61DDE294-9CDB-40A1-93FF-9A39AD164796}" dt="2022-03-30T07:22:56.378" v="16" actId="1076"/>
+          <ac:spMkLst>
+            <pc:docMk/>
+            <pc:sldMk cId="3239150023" sldId="258"/>
+            <ac:spMk id="26" creationId="{0DC7C962-E691-4339-98C3-247F50FC9F43}"/>
+          </ac:spMkLst>
+        </pc:spChg>
+        <pc:spChg chg="mod">
+          <ac:chgData name="philipp.spelten@365h-brs.de" userId="bf49d2dc-2959-4525-96a1-3447e597065c" providerId="ADAL" clId="{61DDE294-9CDB-40A1-93FF-9A39AD164796}" dt="2022-03-30T07:59:18.613" v="77" actId="207"/>
+          <ac:spMkLst>
+            <pc:docMk/>
+            <pc:sldMk cId="3239150023" sldId="258"/>
+            <ac:spMk id="31" creationId="{68AD63AF-7E2A-41C5-9796-048774A6BAD0}"/>
+          </ac:spMkLst>
+        </pc:spChg>
+        <pc:spChg chg="mod">
+          <ac:chgData name="philipp.spelten@365h-brs.de" userId="bf49d2dc-2959-4525-96a1-3447e597065c" providerId="ADAL" clId="{61DDE294-9CDB-40A1-93FF-9A39AD164796}" dt="2022-03-30T07:59:18.613" v="77" actId="207"/>
+          <ac:spMkLst>
+            <pc:docMk/>
+            <pc:sldMk cId="3239150023" sldId="258"/>
+            <ac:spMk id="34" creationId="{7879B12F-DB81-4DC9-B424-CBF7A20D7909}"/>
+          </ac:spMkLst>
+        </pc:spChg>
+        <pc:spChg chg="mod">
+          <ac:chgData name="philipp.spelten@365h-brs.de" userId="bf49d2dc-2959-4525-96a1-3447e597065c" providerId="ADAL" clId="{61DDE294-9CDB-40A1-93FF-9A39AD164796}" dt="2022-03-30T07:59:18.613" v="77" actId="207"/>
+          <ac:spMkLst>
+            <pc:docMk/>
+            <pc:sldMk cId="3239150023" sldId="258"/>
+            <ac:spMk id="36" creationId="{FEEC2804-3101-48A4-B586-986878F53FC2}"/>
+          </ac:spMkLst>
+        </pc:spChg>
+        <pc:spChg chg="add mod">
+          <ac:chgData name="philipp.spelten@365h-brs.de" userId="bf49d2dc-2959-4525-96a1-3447e597065c" providerId="ADAL" clId="{61DDE294-9CDB-40A1-93FF-9A39AD164796}" dt="2022-03-30T07:23:08.540" v="23" actId="1076"/>
+          <ac:spMkLst>
+            <pc:docMk/>
+            <pc:sldMk cId="3239150023" sldId="258"/>
+            <ac:spMk id="39" creationId="{65B55E5D-39D3-4A14-97F1-1911833BEA71}"/>
+          </ac:spMkLst>
+        </pc:spChg>
+        <pc:spChg chg="mod">
+          <ac:chgData name="philipp.spelten@365h-brs.de" userId="bf49d2dc-2959-4525-96a1-3447e597065c" providerId="ADAL" clId="{61DDE294-9CDB-40A1-93FF-9A39AD164796}" dt="2022-03-30T07:59:04.750" v="76" actId="207"/>
+          <ac:spMkLst>
+            <pc:docMk/>
+            <pc:sldMk cId="3239150023" sldId="258"/>
+            <ac:spMk id="58" creationId="{0D5CCA2D-7192-4D03-893F-69C0D66AECD1}"/>
+          </ac:spMkLst>
+        </pc:spChg>
+        <pc:cxnChg chg="mod">
+          <ac:chgData name="philipp.spelten@365h-brs.de" userId="bf49d2dc-2959-4525-96a1-3447e597065c" providerId="ADAL" clId="{61DDE294-9CDB-40A1-93FF-9A39AD164796}" dt="2022-03-30T07:56:26.208" v="73" actId="208"/>
+          <ac:cxnSpMkLst>
+            <pc:docMk/>
+            <pc:sldMk cId="3239150023" sldId="258"/>
+            <ac:cxnSpMk id="22" creationId="{7632CD49-B762-408C-B9AE-F0F75391C9A2}"/>
+          </ac:cxnSpMkLst>
+        </pc:cxnChg>
+        <pc:cxnChg chg="add mod">
+          <ac:chgData name="philipp.spelten@365h-brs.de" userId="bf49d2dc-2959-4525-96a1-3447e597065c" providerId="ADAL" clId="{61DDE294-9CDB-40A1-93FF-9A39AD164796}" dt="2022-03-30T07:22:51.791" v="15" actId="14100"/>
+          <ac:cxnSpMkLst>
+            <pc:docMk/>
+            <pc:sldMk cId="3239150023" sldId="258"/>
+            <ac:cxnSpMk id="37" creationId="{C0D0A835-038A-44D5-B48E-F7FD89E33D93}"/>
+          </ac:cxnSpMkLst>
+        </pc:cxnChg>
+      </pc:sldChg>
+    </pc:docChg>
+  </pc:docChgLst>
   <pc:docChgLst>
     <pc:chgData name="philipp.spelten@365h-brs.de" userId="bf49d2dc-2959-4525-96a1-3447e597065c" providerId="ADAL" clId="{76183F54-58DB-4614-A269-AC59A736004A}"/>
     <pc:docChg chg="custSel modSld">
@@ -961,7 +1057,7 @@
           <a:p>
             <a:fld id="{DF0535AC-730B-40C3-8785-3088AB223334}" type="datetimeFigureOut">
               <a:rPr lang="de-DE" smtClean="0"/>
-              <a:t>23.03.2022</a:t>
+              <a:t>30.03.2022</a:t>
             </a:fld>
             <a:endParaRPr lang="de-DE"/>
           </a:p>
@@ -1159,7 +1255,7 @@
           <a:p>
             <a:fld id="{DF0535AC-730B-40C3-8785-3088AB223334}" type="datetimeFigureOut">
               <a:rPr lang="de-DE" smtClean="0"/>
-              <a:t>23.03.2022</a:t>
+              <a:t>30.03.2022</a:t>
             </a:fld>
             <a:endParaRPr lang="de-DE"/>
           </a:p>
@@ -1367,7 +1463,7 @@
           <a:p>
             <a:fld id="{DF0535AC-730B-40C3-8785-3088AB223334}" type="datetimeFigureOut">
               <a:rPr lang="de-DE" smtClean="0"/>
-              <a:t>23.03.2022</a:t>
+              <a:t>30.03.2022</a:t>
             </a:fld>
             <a:endParaRPr lang="de-DE"/>
           </a:p>
@@ -1565,7 +1661,7 @@
           <a:p>
             <a:fld id="{DF0535AC-730B-40C3-8785-3088AB223334}" type="datetimeFigureOut">
               <a:rPr lang="de-DE" smtClean="0"/>
-              <a:t>23.03.2022</a:t>
+              <a:t>30.03.2022</a:t>
             </a:fld>
             <a:endParaRPr lang="de-DE"/>
           </a:p>
@@ -1840,7 +1936,7 @@
           <a:p>
             <a:fld id="{DF0535AC-730B-40C3-8785-3088AB223334}" type="datetimeFigureOut">
               <a:rPr lang="de-DE" smtClean="0"/>
-              <a:t>23.03.2022</a:t>
+              <a:t>30.03.2022</a:t>
             </a:fld>
             <a:endParaRPr lang="de-DE"/>
           </a:p>
@@ -2105,7 +2201,7 @@
           <a:p>
             <a:fld id="{DF0535AC-730B-40C3-8785-3088AB223334}" type="datetimeFigureOut">
               <a:rPr lang="de-DE" smtClean="0"/>
-              <a:t>23.03.2022</a:t>
+              <a:t>30.03.2022</a:t>
             </a:fld>
             <a:endParaRPr lang="de-DE"/>
           </a:p>
@@ -2517,7 +2613,7 @@
           <a:p>
             <a:fld id="{DF0535AC-730B-40C3-8785-3088AB223334}" type="datetimeFigureOut">
               <a:rPr lang="de-DE" smtClean="0"/>
-              <a:t>23.03.2022</a:t>
+              <a:t>30.03.2022</a:t>
             </a:fld>
             <a:endParaRPr lang="de-DE"/>
           </a:p>
@@ -2658,7 +2754,7 @@
           <a:p>
             <a:fld id="{DF0535AC-730B-40C3-8785-3088AB223334}" type="datetimeFigureOut">
               <a:rPr lang="de-DE" smtClean="0"/>
-              <a:t>23.03.2022</a:t>
+              <a:t>30.03.2022</a:t>
             </a:fld>
             <a:endParaRPr lang="de-DE"/>
           </a:p>
@@ -2771,7 +2867,7 @@
           <a:p>
             <a:fld id="{DF0535AC-730B-40C3-8785-3088AB223334}" type="datetimeFigureOut">
               <a:rPr lang="de-DE" smtClean="0"/>
-              <a:t>23.03.2022</a:t>
+              <a:t>30.03.2022</a:t>
             </a:fld>
             <a:endParaRPr lang="de-DE"/>
           </a:p>
@@ -3082,7 +3178,7 @@
           <a:p>
             <a:fld id="{DF0535AC-730B-40C3-8785-3088AB223334}" type="datetimeFigureOut">
               <a:rPr lang="de-DE" smtClean="0"/>
-              <a:t>23.03.2022</a:t>
+              <a:t>30.03.2022</a:t>
             </a:fld>
             <a:endParaRPr lang="de-DE"/>
           </a:p>
@@ -3370,7 +3466,7 @@
           <a:p>
             <a:fld id="{DF0535AC-730B-40C3-8785-3088AB223334}" type="datetimeFigureOut">
               <a:rPr lang="de-DE" smtClean="0"/>
-              <a:t>23.03.2022</a:t>
+              <a:t>30.03.2022</a:t>
             </a:fld>
             <a:endParaRPr lang="de-DE"/>
           </a:p>
@@ -3611,7 +3707,7 @@
           <a:p>
             <a:fld id="{DF0535AC-730B-40C3-8785-3088AB223334}" type="datetimeFigureOut">
               <a:rPr lang="de-DE" smtClean="0"/>
-              <a:t>23.03.2022</a:t>
+              <a:t>30.03.2022</a:t>
             </a:fld>
             <a:endParaRPr lang="de-DE"/>
           </a:p>
@@ -8468,7 +8564,7 @@
                       <m:r>
                         <a:rPr lang="de-DE" sz="2800" b="1" i="1" smtClean="0">
                           <a:solidFill>
-                            <a:srgbClr val="4472C4"/>
+                            <a:srgbClr val="0072BD"/>
                           </a:solidFill>
                           <a:latin typeface="Cambria Math" panose="02040503050406030204" pitchFamily="18" charset="0"/>
                         </a:rPr>
@@ -8479,7 +8575,7 @@
                 </a14:m>
                 <a:endParaRPr lang="de-DE" sz="2800" b="1" dirty="0">
                   <a:solidFill>
-                    <a:srgbClr val="4472C4"/>
+                    <a:srgbClr val="0072BD"/>
                   </a:solidFill>
                 </a:endParaRPr>
               </a:p>
@@ -8623,7 +8719,7 @@
                       <m:r>
                         <a:rPr lang="de-DE" sz="2800" b="1" i="1" smtClean="0">
                           <a:solidFill>
-                            <a:srgbClr val="4472C4"/>
+                            <a:srgbClr val="0072BD"/>
                           </a:solidFill>
                           <a:latin typeface="Cambria Math" panose="02040503050406030204" pitchFamily="18" charset="0"/>
                         </a:rPr>
@@ -8634,7 +8730,7 @@
                 </a14:m>
                 <a:endParaRPr lang="de-DE" sz="2800" b="1" dirty="0">
                   <a:solidFill>
-                    <a:srgbClr val="4472C4"/>
+                    <a:srgbClr val="0072BD"/>
                   </a:solidFill>
                 </a:endParaRPr>
               </a:p>
@@ -8798,8 +8894,8 @@
           </p:sp>
         </mc:Fallback>
       </mc:AlternateContent>
-      <mc:AlternateContent xmlns:mc="http://schemas.openxmlformats.org/markup-compatibility/2006">
-        <mc:Choice xmlns:a14="http://schemas.microsoft.com/office/drawing/2010/main" Requires="a14">
+      <mc:AlternateContent xmlns:mc="http://schemas.openxmlformats.org/markup-compatibility/2006" xmlns:a14="http://schemas.microsoft.com/office/drawing/2010/main">
+        <mc:Choice Requires="a14">
           <p:sp>
             <p:nvSpPr>
               <p:cNvPr id="25" name="Textfeld 24">
@@ -8890,7 +8986,7 @@
             </p:txBody>
           </p:sp>
         </mc:Choice>
-        <mc:Fallback>
+        <mc:Fallback xmlns="">
           <p:sp>
             <p:nvSpPr>
               <p:cNvPr id="25" name="Textfeld 24">
@@ -8935,8 +9031,8 @@
           </p:sp>
         </mc:Fallback>
       </mc:AlternateContent>
-      <mc:AlternateContent xmlns:mc="http://schemas.openxmlformats.org/markup-compatibility/2006">
-        <mc:Choice xmlns:a14="http://schemas.microsoft.com/office/drawing/2010/main" Requires="a14">
+      <mc:AlternateContent xmlns:mc="http://schemas.openxmlformats.org/markup-compatibility/2006" xmlns:a14="http://schemas.microsoft.com/office/drawing/2010/main">
+        <mc:Choice Requires="a14">
           <p:sp>
             <p:nvSpPr>
               <p:cNvPr id="26" name="Textfeld 25">
@@ -8951,7 +9047,7 @@
             </p:nvSpPr>
             <p:spPr>
               <a:xfrm>
-                <a:off x="6202017" y="3727172"/>
+                <a:off x="5979611" y="3404601"/>
                 <a:ext cx="561311" cy="584775"/>
               </a:xfrm>
               <a:prstGeom prst="rect">
@@ -9027,7 +9123,7 @@
             </p:txBody>
           </p:sp>
         </mc:Choice>
-        <mc:Fallback>
+        <mc:Fallback xmlns="">
           <p:sp>
             <p:nvSpPr>
               <p:cNvPr id="26" name="Textfeld 25">
@@ -9044,7 +9140,7 @@
             </p:nvSpPr>
             <p:spPr>
               <a:xfrm>
-                <a:off x="6202017" y="3727172"/>
+                <a:off x="5979611" y="3404601"/>
                 <a:ext cx="561311" cy="584775"/>
               </a:xfrm>
               <a:prstGeom prst="rect">
@@ -9294,7 +9390,7 @@
                       <m:r>
                         <a:rPr lang="de-DE" sz="2800" b="1" i="1" smtClean="0">
                           <a:solidFill>
-                            <a:srgbClr val="4472C4"/>
+                            <a:srgbClr val="0072BD"/>
                           </a:solidFill>
                           <a:latin typeface="Cambria Math" panose="02040503050406030204" pitchFamily="18" charset="0"/>
                         </a:rPr>
@@ -9305,7 +9401,7 @@
                 </a14:m>
                 <a:endParaRPr lang="de-DE" sz="2800" b="1" dirty="0">
                   <a:solidFill>
-                    <a:srgbClr val="4472C4"/>
+                    <a:srgbClr val="0072BD"/>
                   </a:solidFill>
                 </a:endParaRPr>
               </a:p>
@@ -9449,7 +9545,7 @@
                       <m:r>
                         <a:rPr lang="de-DE" sz="2800" b="1" i="1" smtClean="0">
                           <a:solidFill>
-                            <a:srgbClr val="4472C4"/>
+                            <a:srgbClr val="0072BD"/>
                           </a:solidFill>
                           <a:latin typeface="Cambria Math" panose="02040503050406030204" pitchFamily="18" charset="0"/>
                         </a:rPr>
@@ -9458,7 +9554,7 @@
                       <m:r>
                         <a:rPr lang="de-DE" sz="2800" b="1" i="1" smtClean="0">
                           <a:solidFill>
-                            <a:srgbClr val="4472C4"/>
+                            <a:srgbClr val="0072BD"/>
                           </a:solidFill>
                           <a:latin typeface="Cambria Math" panose="02040503050406030204" pitchFamily="18" charset="0"/>
                         </a:rPr>
@@ -9467,7 +9563,7 @@
                       <m:r>
                         <a:rPr lang="de-DE" sz="2800" b="1" i="1" smtClean="0">
                           <a:solidFill>
-                            <a:srgbClr val="4472C4"/>
+                            <a:srgbClr val="0072BD"/>
                           </a:solidFill>
                           <a:latin typeface="Cambria Math" panose="02040503050406030204" pitchFamily="18" charset="0"/>
                         </a:rPr>
@@ -9478,7 +9574,7 @@
                           <m:ctrlPr>
                             <a:rPr lang="de-DE" sz="2800" b="1" i="1" smtClean="0">
                               <a:solidFill>
-                                <a:srgbClr val="4472C4"/>
+                                <a:srgbClr val="0072BD"/>
                               </a:solidFill>
                               <a:latin typeface="Cambria Math" panose="02040503050406030204" pitchFamily="18" charset="0"/>
                             </a:rPr>
@@ -9488,7 +9584,7 @@
                           <m:r>
                             <a:rPr lang="de-DE" sz="2800" b="1" i="1" smtClean="0">
                               <a:solidFill>
-                                <a:srgbClr val="4472C4"/>
+                                <a:srgbClr val="0072BD"/>
                               </a:solidFill>
                               <a:latin typeface="Cambria Math" panose="02040503050406030204" pitchFamily="18" charset="0"/>
                             </a:rPr>
@@ -9501,7 +9597,7 @@
                 </a14:m>
                 <a:endParaRPr lang="de-DE" sz="2800" b="1" dirty="0">
                   <a:solidFill>
-                    <a:srgbClr val="4472C4"/>
+                    <a:srgbClr val="0072BD"/>
                   </a:solidFill>
                 </a:endParaRPr>
               </a:p>
@@ -9657,7 +9753,7 @@
                       <m:r>
                         <a:rPr lang="de-DE" sz="2800" b="1" i="1" smtClean="0">
                           <a:solidFill>
-                            <a:srgbClr val="4472C4"/>
+                            <a:srgbClr val="0072BD"/>
                           </a:solidFill>
                           <a:latin typeface="Cambria Math" panose="02040503050406030204" pitchFamily="18" charset="0"/>
                         </a:rPr>
@@ -9668,7 +9764,7 @@
                 </a14:m>
                 <a:endParaRPr lang="de-DE" sz="2800" b="1" dirty="0">
                   <a:solidFill>
-                    <a:srgbClr val="4472C4"/>
+                    <a:srgbClr val="0072BD"/>
                   </a:solidFill>
                 </a:endParaRPr>
               </a:p>
@@ -9791,8 +9887,8 @@
         </p:nvSpPr>
         <p:spPr>
           <a:xfrm>
-            <a:off x="6613805" y="855434"/>
-            <a:ext cx="3369771" cy="1015663"/>
+            <a:off x="6251693" y="855434"/>
+            <a:ext cx="3731884" cy="1015663"/>
           </a:xfrm>
           <a:prstGeom prst="rect">
             <a:avLst/>
@@ -9812,7 +9908,23 @@
                   <a:srgbClr val="D95319"/>
                 </a:solidFill>
               </a:rPr>
-              <a:t>Trägheits-/D‘Alembert-Kräfte</a:t>
+              <a:t>(</a:t>
+            </a:r>
+            <a:r>
+              <a:rPr lang="de-DE" sz="2000" b="1" dirty="0" err="1">
+                <a:solidFill>
+                  <a:srgbClr val="D95319"/>
+                </a:solidFill>
+              </a:rPr>
+              <a:t>D‘Alembert‘sche</a:t>
+            </a:r>
+            <a:r>
+              <a:rPr lang="de-DE" sz="2000" b="1" dirty="0">
+                <a:solidFill>
+                  <a:srgbClr val="D95319"/>
+                </a:solidFill>
+              </a:rPr>
+              <a:t>) Trägheitskräfte</a:t>
             </a:r>
           </a:p>
           <a:p>
@@ -9823,7 +9935,7 @@
                   <a:srgbClr val="FFC000"/>
                 </a:solidFill>
               </a:rPr>
-              <a:t>Eingeprägte Kräfte</a:t>
+              <a:t>Eingeprägte und Zwangs-Kräfte</a:t>
             </a:r>
           </a:p>
           <a:p>
@@ -9831,14 +9943,193 @@
             <a:r>
               <a:rPr lang="de-DE" sz="2000" b="1" dirty="0">
                 <a:solidFill>
-                  <a:srgbClr val="4472C4"/>
+                  <a:srgbClr val="0072BD"/>
                 </a:solidFill>
               </a:rPr>
-              <a:t>Maße</a:t>
+              <a:t>Maße und Variablen</a:t>
             </a:r>
           </a:p>
         </p:txBody>
       </p:sp>
+      <p:cxnSp>
+        <p:nvCxnSpPr>
+          <p:cNvPr id="37" name="Gerade Verbindung mit Pfeil 36">
+            <a:extLst>
+              <a:ext uri="{FF2B5EF4-FFF2-40B4-BE49-F238E27FC236}">
+                <a16:creationId xmlns:a16="http://schemas.microsoft.com/office/drawing/2014/main" id="{C0D0A835-038A-44D5-B48E-F7FD89E33D93}"/>
+              </a:ext>
+            </a:extLst>
+          </p:cNvPr>
+          <p:cNvCxnSpPr>
+            <a:cxnSpLocks/>
+            <a:stCxn id="43" idx="1"/>
+          </p:cNvCxnSpPr>
+          <p:nvPr/>
+        </p:nvCxnSpPr>
+        <p:spPr>
+          <a:xfrm flipH="1" flipV="1">
+            <a:off x="7026331" y="3767127"/>
+            <a:ext cx="637893" cy="776867"/>
+          </a:xfrm>
+          <a:prstGeom prst="straightConnector1">
+            <a:avLst/>
+          </a:prstGeom>
+          <a:ln w="57150">
+            <a:solidFill>
+              <a:srgbClr val="FFC000"/>
+            </a:solidFill>
+            <a:tailEnd type="triangle"/>
+          </a:ln>
+        </p:spPr>
+        <p:style>
+          <a:lnRef idx="1">
+            <a:schemeClr val="accent1"/>
+          </a:lnRef>
+          <a:fillRef idx="0">
+            <a:schemeClr val="accent1"/>
+          </a:fillRef>
+          <a:effectRef idx="0">
+            <a:schemeClr val="accent1"/>
+          </a:effectRef>
+          <a:fontRef idx="minor">
+            <a:schemeClr val="tx1"/>
+          </a:fontRef>
+        </p:style>
+      </p:cxnSp>
+      <mc:AlternateContent xmlns:mc="http://schemas.openxmlformats.org/markup-compatibility/2006" xmlns:a14="http://schemas.microsoft.com/office/drawing/2010/main">
+        <mc:Choice Requires="a14">
+          <p:sp>
+            <p:nvSpPr>
+              <p:cNvPr id="39" name="Textfeld 38">
+                <a:extLst>
+                  <a:ext uri="{FF2B5EF4-FFF2-40B4-BE49-F238E27FC236}">
+                    <a16:creationId xmlns:a16="http://schemas.microsoft.com/office/drawing/2014/main" id="{65B55E5D-39D3-4A14-97F1-1911833BEA71}"/>
+                  </a:ext>
+                </a:extLst>
+              </p:cNvPr>
+              <p:cNvSpPr txBox="1"/>
+              <p:nvPr/>
+            </p:nvSpPr>
+            <p:spPr>
+              <a:xfrm>
+                <a:off x="6847240" y="4012112"/>
+                <a:ext cx="561311" cy="584775"/>
+              </a:xfrm>
+              <a:prstGeom prst="rect">
+                <a:avLst/>
+              </a:prstGeom>
+              <a:noFill/>
+              <a:ln>
+                <a:noFill/>
+              </a:ln>
+            </p:spPr>
+            <p:txBody>
+              <a:bodyPr wrap="square" rtlCol="0">
+                <a:spAutoFit/>
+              </a:bodyPr>
+              <a:lstStyle/>
+              <a:p>
+                <a:pPr/>
+                <a14:m>
+                  <m:oMathPara xmlns:m="http://schemas.openxmlformats.org/officeDocument/2006/math">
+                    <m:oMathParaPr>
+                      <m:jc m:val="centerGroup"/>
+                    </m:oMathParaPr>
+                    <m:oMath xmlns:m="http://schemas.openxmlformats.org/officeDocument/2006/math">
+                      <m:sSub>
+                        <m:sSubPr>
+                          <m:ctrlPr>
+                            <a:rPr lang="de-DE" sz="3200" b="1" i="1" smtClean="0">
+                              <a:solidFill>
+                                <a:srgbClr val="FFC000"/>
+                              </a:solidFill>
+                              <a:latin typeface="Cambria Math" panose="02040503050406030204" pitchFamily="18" charset="0"/>
+                            </a:rPr>
+                          </m:ctrlPr>
+                        </m:sSubPr>
+                        <m:e>
+                          <m:r>
+                            <a:rPr lang="de-DE" sz="3200" b="1" i="1" smtClean="0">
+                              <a:solidFill>
+                                <a:srgbClr val="FFC000"/>
+                              </a:solidFill>
+                              <a:latin typeface="Cambria Math" panose="02040503050406030204" pitchFamily="18" charset="0"/>
+                            </a:rPr>
+                            <m:t>𝑭</m:t>
+                          </m:r>
+                        </m:e>
+                        <m:sub>
+                          <m:r>
+                            <a:rPr lang="de-DE" sz="3200" b="1" i="1" smtClean="0">
+                              <a:solidFill>
+                                <a:srgbClr val="FFC000"/>
+                              </a:solidFill>
+                              <a:latin typeface="Cambria Math" panose="02040503050406030204" pitchFamily="18" charset="0"/>
+                            </a:rPr>
+                            <m:t>𝑺</m:t>
+                          </m:r>
+                        </m:sub>
+                      </m:sSub>
+                    </m:oMath>
+                  </m:oMathPara>
+                </a14:m>
+                <a:endParaRPr lang="de-DE" sz="3200" b="1" dirty="0">
+                  <a:solidFill>
+                    <a:srgbClr val="FFC000"/>
+                  </a:solidFill>
+                </a:endParaRPr>
+              </a:p>
+            </p:txBody>
+          </p:sp>
+        </mc:Choice>
+        <mc:Fallback xmlns="">
+          <p:sp>
+            <p:nvSpPr>
+              <p:cNvPr id="39" name="Textfeld 38">
+                <a:extLst>
+                  <a:ext uri="{FF2B5EF4-FFF2-40B4-BE49-F238E27FC236}">
+                    <a16:creationId xmlns:a16="http://schemas.microsoft.com/office/drawing/2014/main" id="{65B55E5D-39D3-4A14-97F1-1911833BEA71}"/>
+                  </a:ext>
+                </a:extLst>
+              </p:cNvPr>
+              <p:cNvSpPr txBox="1">
+                <a:spLocks noRot="1" noChangeAspect="1" noMove="1" noResize="1" noEditPoints="1" noAdjustHandles="1" noChangeArrowheads="1" noChangeShapeType="1" noTextEdit="1"/>
+              </p:cNvSpPr>
+              <p:nvPr/>
+            </p:nvSpPr>
+            <p:spPr>
+              <a:xfrm>
+                <a:off x="6847240" y="4012112"/>
+                <a:ext cx="561311" cy="584775"/>
+              </a:xfrm>
+              <a:prstGeom prst="rect">
+                <a:avLst/>
+              </a:prstGeom>
+              <a:blipFill>
+                <a:blip r:embed="rId10"/>
+                <a:stretch>
+                  <a:fillRect/>
+                </a:stretch>
+              </a:blipFill>
+              <a:ln>
+                <a:noFill/>
+              </a:ln>
+            </p:spPr>
+            <p:txBody>
+              <a:bodyPr/>
+              <a:lstStyle/>
+              <a:p>
+                <a:r>
+                  <a:rPr lang="de-DE">
+                    <a:noFill/>
+                  </a:rPr>
+                  <a:t> </a:t>
+                </a:r>
+              </a:p>
+            </p:txBody>
+          </p:sp>
+        </mc:Fallback>
+      </mc:AlternateContent>
     </p:spTree>
     <p:extLst>
       <p:ext uri="{BB962C8B-B14F-4D97-AF65-F5344CB8AC3E}">

</xml_diff>